<commit_message>
Finally pushing old update from changes and publishing work done since original presentation
</commit_message>
<xml_diff>
--- a/presentation.pptx
+++ b/presentation.pptx
@@ -105,6 +105,11 @@
       </a:defRPr>
     </a:lvl9pPr>
   </p:defaultTextStyle>
+  <p:extLst>
+    <p:ext uri="{EFAFB233-063F-42B5-8137-9DF3F51BA10A}">
+      <p15:sldGuideLst xmlns:p15="http://schemas.microsoft.com/office/powerpoint/2012/main"/>
+    </p:ext>
+  </p:extLst>
 </p:presentation>
 </file>
 
@@ -336,7 +341,7 @@
           <a:p>
             <a:fld id="{556D9AFB-128A-400D-A3B8-64FE3B60E608}" type="datetimeFigureOut">
               <a:rPr lang="en-US" smtClean="0"/>
-              <a:t>11/30/2014</a:t>
+              <a:t>12/1/2014</a:t>
             </a:fld>
             <a:endParaRPr lang="en-US"/>
           </a:p>
@@ -544,7 +549,7 @@
           <a:p>
             <a:fld id="{556D9AFB-128A-400D-A3B8-64FE3B60E608}" type="datetimeFigureOut">
               <a:rPr lang="en-US" smtClean="0"/>
-              <a:t>11/30/2014</a:t>
+              <a:t>12/1/2014</a:t>
             </a:fld>
             <a:endParaRPr lang="en-US"/>
           </a:p>
@@ -802,7 +807,7 @@
           <a:p>
             <a:fld id="{556D9AFB-128A-400D-A3B8-64FE3B60E608}" type="datetimeFigureOut">
               <a:rPr lang="en-US" smtClean="0"/>
-              <a:t>11/30/2014</a:t>
+              <a:t>12/1/2014</a:t>
             </a:fld>
             <a:endParaRPr lang="en-US"/>
           </a:p>
@@ -972,7 +977,7 @@
           <a:p>
             <a:fld id="{556D9AFB-128A-400D-A3B8-64FE3B60E608}" type="datetimeFigureOut">
               <a:rPr lang="en-US" smtClean="0"/>
-              <a:t>11/30/2014</a:t>
+              <a:t>12/1/2014</a:t>
             </a:fld>
             <a:endParaRPr lang="en-US"/>
           </a:p>
@@ -1309,7 +1314,7 @@
           <a:p>
             <a:fld id="{556D9AFB-128A-400D-A3B8-64FE3B60E608}" type="datetimeFigureOut">
               <a:rPr lang="en-US" smtClean="0"/>
-              <a:t>11/30/2014</a:t>
+              <a:t>12/1/2014</a:t>
             </a:fld>
             <a:endParaRPr lang="en-US"/>
           </a:p>
@@ -1584,7 +1589,7 @@
           <a:p>
             <a:fld id="{556D9AFB-128A-400D-A3B8-64FE3B60E608}" type="datetimeFigureOut">
               <a:rPr lang="en-US" smtClean="0"/>
-              <a:t>11/30/2014</a:t>
+              <a:t>12/1/2014</a:t>
             </a:fld>
             <a:endParaRPr lang="en-US"/>
           </a:p>
@@ -1963,7 +1968,7 @@
           <a:p>
             <a:fld id="{556D9AFB-128A-400D-A3B8-64FE3B60E608}" type="datetimeFigureOut">
               <a:rPr lang="en-US" smtClean="0"/>
-              <a:t>11/30/2014</a:t>
+              <a:t>12/1/2014</a:t>
             </a:fld>
             <a:endParaRPr lang="en-US"/>
           </a:p>
@@ -2081,7 +2086,7 @@
           <a:p>
             <a:fld id="{556D9AFB-128A-400D-A3B8-64FE3B60E608}" type="datetimeFigureOut">
               <a:rPr lang="en-US" smtClean="0"/>
-              <a:t>11/30/2014</a:t>
+              <a:t>12/1/2014</a:t>
             </a:fld>
             <a:endParaRPr lang="en-US"/>
           </a:p>
@@ -2254,7 +2259,7 @@
           <a:p>
             <a:fld id="{556D9AFB-128A-400D-A3B8-64FE3B60E608}" type="datetimeFigureOut">
               <a:rPr lang="en-US" smtClean="0"/>
-              <a:t>11/30/2014</a:t>
+              <a:t>12/1/2014</a:t>
             </a:fld>
             <a:endParaRPr lang="en-US"/>
           </a:p>
@@ -2610,7 +2615,7 @@
           <a:p>
             <a:fld id="{556D9AFB-128A-400D-A3B8-64FE3B60E608}" type="datetimeFigureOut">
               <a:rPr lang="en-US" smtClean="0"/>
-              <a:t>11/30/2014</a:t>
+              <a:t>12/1/2014</a:t>
             </a:fld>
             <a:endParaRPr lang="en-US"/>
           </a:p>
@@ -2989,7 +2994,7 @@
           <a:p>
             <a:fld id="{556D9AFB-128A-400D-A3B8-64FE3B60E608}" type="datetimeFigureOut">
               <a:rPr lang="en-US" smtClean="0"/>
-              <a:t>11/30/2014</a:t>
+              <a:t>12/1/2014</a:t>
             </a:fld>
             <a:endParaRPr lang="en-US"/>
           </a:p>
@@ -3278,7 +3283,7 @@
           <a:p>
             <a:fld id="{556D9AFB-128A-400D-A3B8-64FE3B60E608}" type="datetimeFigureOut">
               <a:rPr lang="en-US" smtClean="0"/>
-              <a:t>11/30/2014</a:t>
+              <a:t>12/1/2014</a:t>
             </a:fld>
             <a:endParaRPr lang="en-US"/>
           </a:p>

</xml_diff>